<commit_message>
Suppression du min stability dans composer
</commit_message>
<xml_diff>
--- a/tests/Core/Office/results/test_office_save.pptx
+++ b/tests/Core/Office/results/test_office_save.pptx
@@ -161,7 +161,7 @@
   </p:cSld>
   <p:clrMap bg1="lt1" tx1="dk1" bg2="lt2" tx2="dk2" accent1="accent1" accent2="accent2" accent3="accent3" accent4="accent4" accent5="accent5" accent6="accent6" hlink="hlink" folHlink="folHlink"/>
   <p:sldLayoutIdLst>
-    <p:sldLayoutId id="2237339301" r:id="rId1"/>
+    <p:sldLayoutId id="2237341777" r:id="rId1"/>
   </p:sldLayoutIdLst>
   <p:txStyles>
     <p:titleStyle>
@@ -265,9 +265,9 @@
 </file>
 
 <file path=ppt/theme/theme1.xml><?xml version="1.0" encoding="utf-8"?>
-<a:theme xmlns:a="http://schemas.openxmlformats.org/drawingml/2006/main" name="Theme98">
+<a:theme xmlns:a="http://schemas.openxmlformats.org/drawingml/2006/main" name="Theme35">
   <a:themeElements>
-    <a:clrScheme name="Theme98">
+    <a:clrScheme name="Theme35">
       <a:dk1>
         <a:sysClr val="windowText" lastClr="000000"/>
       </a:dk1>
@@ -305,7 +305,7 @@
         <a:srgbClr val="800080"/>
       </a:folHlink>
     </a:clrScheme>
-    <a:fontScheme name="Theme98">
+    <a:fontScheme name="Theme35">
       <a:majorFont>
         <a:latin typeface="Calibri"/>
         <a:ea typeface=""/>
@@ -375,7 +375,7 @@
         <a:font script="Uigh" typeface="Microsoft Uighur"/>
       </a:minorFont>
     </a:fontScheme>
-    <a:fmtScheme name="Theme98">
+    <a:fmtScheme name="Theme35">
       <a:fillStyleLst>
         <a:solidFill>
           <a:schemeClr val="phClr"/>

</xml_diff>